<commit_message>
Add SC image and minor mod to text.
</commit_message>
<xml_diff>
--- a/Presentations/Release Presentations/3.1/Release 3.1 Presentation.pptx
+++ b/Presentations/Release Presentations/3.1/Release 3.1 Presentation.pptx
@@ -437,7 +437,7 @@
             <a:tailEnd/>
           </a:ln>
           <a:extLst>
-            <a:ext uri="{909E8E84-426E-40DD-AFC4-6F175D3DCCD1}">
+            <a:ext uri="{909E8E84-426E-40dd-AFC4-6F175D3DCCD1}">
               <a14:hiddenFill xmlns:a14="http://schemas.microsoft.com/office/drawing/2010/main">
                 <a:solidFill>
                   <a:srgbClr val="FFFFFF"/>
@@ -785,14 +785,14 @@
           <a:noFill/>
           <a:ln/>
           <a:extLst>
-            <a:ext uri="{909E8E84-426E-40DD-AFC4-6F175D3DCCD1}">
+            <a:ext uri="{909E8E84-426E-40dd-AFC4-6F175D3DCCD1}">
               <a14:hiddenFill xmlns:a14="http://schemas.microsoft.com/office/drawing/2010/main">
                 <a:solidFill>
                   <a:srgbClr val="FFFFFF"/>
                 </a:solidFill>
               </a14:hiddenFill>
             </a:ext>
-            <a:ext uri="{91240B29-F687-4F45-9708-019B960494DF}">
+            <a:ext uri="{91240B29-F687-4f45-9708-019B960494DF}">
               <a14:hiddenLine xmlns:a14="http://schemas.microsoft.com/office/drawing/2010/main" w="9525">
                 <a:solidFill>
                   <a:srgbClr val="000000"/>
@@ -947,14 +947,14 @@
           <a:noFill/>
           <a:ln/>
           <a:extLst>
-            <a:ext uri="{909E8E84-426E-40DD-AFC4-6F175D3DCCD1}">
+            <a:ext uri="{909E8E84-426E-40dd-AFC4-6F175D3DCCD1}">
               <a14:hiddenFill xmlns:a14="http://schemas.microsoft.com/office/drawing/2010/main">
                 <a:solidFill>
                   <a:srgbClr val="FFFFFF"/>
                 </a:solidFill>
               </a14:hiddenFill>
             </a:ext>
-            <a:ext uri="{91240B29-F687-4F45-9708-019B960494DF}">
+            <a:ext uri="{91240B29-F687-4f45-9708-019B960494DF}">
               <a14:hiddenLine xmlns:a14="http://schemas.microsoft.com/office/drawing/2010/main" w="9525">
                 <a:solidFill>
                   <a:srgbClr val="000000"/>
@@ -5442,7 +5442,7 @@
           </a:prstGeom>
           <a:noFill/>
           <a:extLst>
-            <a:ext uri="{909E8E84-426E-40DD-AFC4-6F175D3DCCD1}">
+            <a:ext uri="{909E8E84-426E-40dd-AFC4-6F175D3DCCD1}">
               <a14:hiddenFill xmlns:a14="http://schemas.microsoft.com/office/drawing/2010/main">
                 <a:solidFill>
                   <a:srgbClr val="FFFFFF"/>
@@ -5589,7 +5589,7 @@
           </a:prstGeom>
           <a:noFill/>
           <a:extLst>
-            <a:ext uri="{909E8E84-426E-40DD-AFC4-6F175D3DCCD1}">
+            <a:ext uri="{909E8E84-426E-40dd-AFC4-6F175D3DCCD1}">
               <a14:hiddenFill xmlns:a14="http://schemas.microsoft.com/office/drawing/2010/main">
                 <a:solidFill>
                   <a:srgbClr val="FFFFFF"/>
@@ -5630,7 +5630,7 @@
           </a:prstGeom>
           <a:noFill/>
           <a:extLst>
-            <a:ext uri="{909E8E84-426E-40DD-AFC4-6F175D3DCCD1}">
+            <a:ext uri="{909E8E84-426E-40dd-AFC4-6F175D3DCCD1}">
               <a14:hiddenFill xmlns:a14="http://schemas.microsoft.com/office/drawing/2010/main">
                 <a:solidFill>
                   <a:srgbClr val="FFFFFF"/>
@@ -5671,7 +5671,7 @@
           </a:prstGeom>
           <a:noFill/>
           <a:extLst>
-            <a:ext uri="{909E8E84-426E-40DD-AFC4-6F175D3DCCD1}">
+            <a:ext uri="{909E8E84-426E-40dd-AFC4-6F175D3DCCD1}">
               <a14:hiddenFill xmlns:a14="http://schemas.microsoft.com/office/drawing/2010/main">
                 <a:solidFill>
                   <a:srgbClr val="FFFFFF"/>
@@ -7617,14 +7617,14 @@
             <a:noFill/>
           </a:ln>
           <a:extLst>
-            <a:ext uri="{909E8E84-426E-40DD-AFC4-6F175D3DCCD1}">
+            <a:ext uri="{909E8E84-426E-40dd-AFC4-6F175D3DCCD1}">
               <a14:hiddenFill xmlns:a14="http://schemas.microsoft.com/office/drawing/2010/main">
                 <a:solidFill>
                   <a:srgbClr val="FFFFFF"/>
                 </a:solidFill>
               </a14:hiddenFill>
             </a:ext>
-            <a:ext uri="{91240B29-F687-4F45-9708-019B960494DF}">
+            <a:ext uri="{91240B29-F687-4f45-9708-019B960494DF}">
               <a14:hiddenLine xmlns:a14="http://schemas.microsoft.com/office/drawing/2010/main" w="9525">
                 <a:solidFill>
                   <a:srgbClr val="000000"/>
@@ -7675,14 +7675,14 @@
             <a:noFill/>
           </a:ln>
           <a:extLst>
-            <a:ext uri="{909E8E84-426E-40DD-AFC4-6F175D3DCCD1}">
+            <a:ext uri="{909E8E84-426E-40dd-AFC4-6F175D3DCCD1}">
               <a14:hiddenFill xmlns:a14="http://schemas.microsoft.com/office/drawing/2010/main">
                 <a:solidFill>
                   <a:srgbClr val="FFFFFF"/>
                 </a:solidFill>
               </a14:hiddenFill>
             </a:ext>
-            <a:ext uri="{91240B29-F687-4F45-9708-019B960494DF}">
+            <a:ext uri="{91240B29-F687-4f45-9708-019B960494DF}">
               <a14:hiddenLine xmlns:a14="http://schemas.microsoft.com/office/drawing/2010/main" w="9525">
                 <a:solidFill>
                   <a:srgbClr val="000000"/>
@@ -7769,7 +7769,7 @@
           </a:prstGeom>
           <a:noFill/>
           <a:extLst>
-            <a:ext uri="{909E8E84-426E-40DD-AFC4-6F175D3DCCD1}">
+            <a:ext uri="{909E8E84-426E-40dd-AFC4-6F175D3DCCD1}">
               <a14:hiddenFill xmlns:a14="http://schemas.microsoft.com/office/drawing/2010/main">
                 <a:solidFill>
                   <a:srgbClr val="FFFFFF"/>
@@ -7809,7 +7809,7 @@
           </a:prstGeom>
           <a:noFill/>
           <a:extLst>
-            <a:ext uri="{909E8E84-426E-40DD-AFC4-6F175D3DCCD1}">
+            <a:ext uri="{909E8E84-426E-40dd-AFC4-6F175D3DCCD1}">
               <a14:hiddenFill xmlns:a14="http://schemas.microsoft.com/office/drawing/2010/main">
                 <a:solidFill>
                   <a:srgbClr val="FFFFFF"/>
@@ -8288,7 +8288,7 @@
   <p:timing>
     <p:tnLst>
       <p:par>
-        <p:cTn id="1" dur="indefinite" restart="never" nodeType="tmRoot"/>
+        <p:cTn xmlns:p14="http://schemas.microsoft.com/office/powerpoint/2010/main" id="1" dur="indefinite" restart="never" nodeType="tmRoot"/>
       </p:par>
     </p:tnLst>
   </p:timing>
@@ -8504,7 +8504,7 @@
   <p:timing>
     <p:tnLst>
       <p:par>
-        <p:cTn id="1" dur="indefinite" restart="never" nodeType="tmRoot"/>
+        <p:cTn xmlns:p14="http://schemas.microsoft.com/office/powerpoint/2010/main" id="1" dur="indefinite" restart="never" nodeType="tmRoot"/>
       </p:par>
     </p:tnLst>
   </p:timing>
@@ -8898,7 +8898,7 @@
   <p:timing>
     <p:tnLst>
       <p:par>
-        <p:cTn id="1" dur="indefinite" restart="never" nodeType="tmRoot"/>
+        <p:cTn xmlns:p14="http://schemas.microsoft.com/office/powerpoint/2010/main" id="1" dur="indefinite" restart="never" nodeType="tmRoot"/>
       </p:par>
     </p:tnLst>
   </p:timing>
@@ -9122,7 +9122,7 @@
   <p:timing>
     <p:tnLst>
       <p:par>
-        <p:cTn id="1" dur="indefinite" restart="never" nodeType="tmRoot"/>
+        <p:cTn xmlns:p14="http://schemas.microsoft.com/office/powerpoint/2010/main" id="1" dur="indefinite" restart="never" nodeType="tmRoot"/>
       </p:par>
     </p:tnLst>
   </p:timing>
@@ -9392,7 +9392,7 @@
   <p:timing>
     <p:tnLst>
       <p:par>
-        <p:cTn id="1" dur="indefinite" restart="never" nodeType="tmRoot"/>
+        <p:cTn xmlns:p14="http://schemas.microsoft.com/office/powerpoint/2010/main" id="1" dur="indefinite" restart="never" nodeType="tmRoot"/>
       </p:par>
     </p:tnLst>
   </p:timing>
@@ -9629,7 +9629,7 @@
           </a:prstGeom>
           <a:noFill/>
           <a:extLst>
-            <a:ext uri="{909E8E84-426E-40DD-AFC4-6F175D3DCCD1}">
+            <a:ext uri="{909E8E84-426E-40dd-AFC4-6F175D3DCCD1}">
               <a14:hiddenFill xmlns:a14="http://schemas.microsoft.com/office/drawing/2010/main">
                 <a:solidFill>
                   <a:srgbClr val="FFFFFF"/>
@@ -9670,7 +9670,7 @@
           </a:prstGeom>
           <a:noFill/>
           <a:extLst>
-            <a:ext uri="{909E8E84-426E-40DD-AFC4-6F175D3DCCD1}">
+            <a:ext uri="{909E8E84-426E-40dd-AFC4-6F175D3DCCD1}">
               <a14:hiddenFill xmlns:a14="http://schemas.microsoft.com/office/drawing/2010/main">
                 <a:solidFill>
                   <a:srgbClr val="FFFFFF"/>
@@ -9693,7 +9693,7 @@
   <p:timing>
     <p:tnLst>
       <p:par>
-        <p:cTn id="1" dur="indefinite" restart="never" nodeType="tmRoot"/>
+        <p:cTn xmlns:p14="http://schemas.microsoft.com/office/powerpoint/2010/main" id="1" dur="indefinite" restart="never" nodeType="tmRoot"/>
       </p:par>
     </p:tnLst>
   </p:timing>
@@ -9924,7 +9924,7 @@
           </a:prstGeom>
           <a:noFill/>
           <a:extLst>
-            <a:ext uri="{909E8E84-426E-40DD-AFC4-6F175D3DCCD1}">
+            <a:ext uri="{909E8E84-426E-40dd-AFC4-6F175D3DCCD1}">
               <a14:hiddenFill xmlns:a14="http://schemas.microsoft.com/office/drawing/2010/main">
                 <a:solidFill>
                   <a:srgbClr val="FFFFFF"/>
@@ -9947,7 +9947,7 @@
   <p:timing>
     <p:tnLst>
       <p:par>
-        <p:cTn id="1" dur="indefinite" restart="never" nodeType="tmRoot"/>
+        <p:cTn xmlns:p14="http://schemas.microsoft.com/office/powerpoint/2010/main" id="1" dur="indefinite" restart="never" nodeType="tmRoot"/>
       </p:par>
     </p:tnLst>
   </p:timing>
@@ -10052,7 +10052,7 @@
   <p:timing>
     <p:tnLst>
       <p:par>
-        <p:cTn id="1" dur="indefinite" restart="never" nodeType="tmRoot"/>
+        <p:cTn xmlns:p14="http://schemas.microsoft.com/office/powerpoint/2010/main" id="1" dur="indefinite" restart="never" nodeType="tmRoot"/>
       </p:par>
     </p:tnLst>
   </p:timing>
@@ -10112,6 +10112,13 @@
   <p:clrMapOvr>
     <a:masterClrMapping/>
   </p:clrMapOvr>
+  <p:timing>
+    <p:tnLst>
+      <p:par>
+        <p:cTn xmlns:p14="http://schemas.microsoft.com/office/powerpoint/2010/main" id="1" dur="indefinite" restart="never" nodeType="tmRoot"/>
+      </p:par>
+    </p:tnLst>
+  </p:timing>
 </p:sld>
 </file>
 
@@ -10269,7 +10276,7 @@
           </a:prstGeom>
           <a:noFill/>
           <a:extLst>
-            <a:ext uri="{909E8E84-426E-40DD-AFC4-6F175D3DCCD1}">
+            <a:ext uri="{909E8E84-426E-40dd-AFC4-6F175D3DCCD1}">
               <a14:hiddenFill xmlns:a14="http://schemas.microsoft.com/office/drawing/2010/main">
                 <a:solidFill>
                   <a:srgbClr val="FFFFFF"/>
@@ -10310,7 +10317,7 @@
           </a:prstGeom>
           <a:noFill/>
           <a:extLst>
-            <a:ext uri="{909E8E84-426E-40DD-AFC4-6F175D3DCCD1}">
+            <a:ext uri="{909E8E84-426E-40dd-AFC4-6F175D3DCCD1}">
               <a14:hiddenFill xmlns:a14="http://schemas.microsoft.com/office/drawing/2010/main">
                 <a:solidFill>
                   <a:srgbClr val="FFFFFF"/>
@@ -10333,7 +10340,7 @@
   <p:timing>
     <p:tnLst>
       <p:par>
-        <p:cTn id="1" dur="indefinite" restart="never" nodeType="tmRoot"/>
+        <p:cTn xmlns:p14="http://schemas.microsoft.com/office/powerpoint/2010/main" id="1" dur="indefinite" restart="never" nodeType="tmRoot"/>
       </p:par>
     </p:tnLst>
   </p:timing>
@@ -10677,6 +10684,13 @@
   <p:clrMapOvr>
     <a:masterClrMapping/>
   </p:clrMapOvr>
+  <p:timing>
+    <p:tnLst>
+      <p:par>
+        <p:cTn xmlns:p14="http://schemas.microsoft.com/office/powerpoint/2010/main" id="1" dur="indefinite" restart="never" nodeType="tmRoot"/>
+      </p:par>
+    </p:tnLst>
+  </p:timing>
 </p:sld>
 </file>
 
@@ -10797,7 +10811,7 @@
   <p:timing>
     <p:tnLst>
       <p:par>
-        <p:cTn id="1" dur="indefinite" restart="never" nodeType="tmRoot"/>
+        <p:cTn xmlns:p14="http://schemas.microsoft.com/office/powerpoint/2010/main" id="1" dur="indefinite" restart="never" nodeType="tmRoot"/>
       </p:par>
     </p:tnLst>
   </p:timing>
@@ -10865,14 +10879,14 @@
             <a:noFill/>
           </a:ln>
           <a:extLst>
-            <a:ext uri="{909E8E84-426E-40DD-AFC4-6F175D3DCCD1}">
+            <a:ext uri="{909E8E84-426E-40dd-AFC4-6F175D3DCCD1}">
               <a14:hiddenFill xmlns:a14="http://schemas.microsoft.com/office/drawing/2010/main">
                 <a:solidFill>
                   <a:srgbClr val="FFFFFF"/>
                 </a:solidFill>
               </a14:hiddenFill>
             </a:ext>
-            <a:ext uri="{91240B29-F687-4F45-9708-019B960494DF}">
+            <a:ext uri="{91240B29-F687-4f45-9708-019B960494DF}">
               <a14:hiddenLine xmlns:a14="http://schemas.microsoft.com/office/drawing/2010/main" w="9525">
                 <a:solidFill>
                   <a:srgbClr val="000000"/>
@@ -11096,14 +11110,14 @@
             <a:noFill/>
           </a:ln>
           <a:extLst>
-            <a:ext uri="{909E8E84-426E-40DD-AFC4-6F175D3DCCD1}">
+            <a:ext uri="{909E8E84-426E-40dd-AFC4-6F175D3DCCD1}">
               <a14:hiddenFill xmlns:a14="http://schemas.microsoft.com/office/drawing/2010/main">
                 <a:solidFill>
                   <a:srgbClr val="FFFFFF"/>
                 </a:solidFill>
               </a14:hiddenFill>
             </a:ext>
-            <a:ext uri="{91240B29-F687-4F45-9708-019B960494DF}">
+            <a:ext uri="{91240B29-F687-4f45-9708-019B960494DF}">
               <a14:hiddenLine xmlns:a14="http://schemas.microsoft.com/office/drawing/2010/main" w="9525">
                 <a:solidFill>
                   <a:srgbClr val="000000"/>
@@ -11371,7 +11385,7 @@
   <p:timing>
     <p:tnLst>
       <p:par>
-        <p:cTn id="1" dur="indefinite" restart="never" nodeType="tmRoot"/>
+        <p:cTn xmlns:p14="http://schemas.microsoft.com/office/powerpoint/2010/main" id="1" dur="indefinite" restart="never" nodeType="tmRoot"/>
       </p:par>
     </p:tnLst>
   </p:timing>
@@ -11431,6 +11445,13 @@
   <p:clrMapOvr>
     <a:masterClrMapping/>
   </p:clrMapOvr>
+  <p:timing>
+    <p:tnLst>
+      <p:par>
+        <p:cTn xmlns:p14="http://schemas.microsoft.com/office/powerpoint/2010/main" id="1" dur="indefinite" restart="never" nodeType="tmRoot"/>
+      </p:par>
+    </p:tnLst>
+  </p:timing>
 </p:sld>
 </file>
 
@@ -11522,7 +11543,7 @@
                   <a:t>Option to constrain </a:t>
                 </a:r>
                 <a14:m>
-                  <m:oMath xmlns:m="http://schemas.openxmlformats.org/officeDocument/2006/math">
+                  <m:oMath xmlns:m="http://schemas.openxmlformats.org/officeDocument/2006/math" xmlns="">
                     <m:r>
                       <a:rPr lang="en-GB" sz="1800" i="1" smtClean="0">
                         <a:latin typeface="Cambria Math"/>
@@ -11537,7 +11558,7 @@
                   <a:t> in a stretched exponential over all </a:t>
                 </a:r>
                 <a14:m>
-                  <m:oMath xmlns:m="http://schemas.openxmlformats.org/officeDocument/2006/math">
+                  <m:oMath xmlns:m="http://schemas.openxmlformats.org/officeDocument/2006/math" xmlns="">
                     <m:r>
                       <a:rPr lang="en-GB" sz="1800" b="0" i="1" smtClean="0">
                         <a:latin typeface="Cambria Math"/>
@@ -11754,7 +11775,7 @@
   <p:timing>
     <p:tnLst>
       <p:par>
-        <p:cTn id="1" dur="indefinite" restart="never" nodeType="tmRoot"/>
+        <p:cTn xmlns:p14="http://schemas.microsoft.com/office/powerpoint/2010/main" id="1" dur="indefinite" restart="never" nodeType="tmRoot"/>
       </p:par>
     </p:tnLst>
   </p:timing>
@@ -11814,6 +11835,13 @@
   <p:clrMapOvr>
     <a:masterClrMapping/>
   </p:clrMapOvr>
+  <p:timing>
+    <p:tnLst>
+      <p:par>
+        <p:cTn xmlns:p14="http://schemas.microsoft.com/office/powerpoint/2010/main" id="1" dur="indefinite" restart="never" nodeType="tmRoot"/>
+      </p:par>
+    </p:tnLst>
+  </p:timing>
 </p:sld>
 </file>
 
@@ -11897,6 +11925,13 @@
   <p:clrMapOvr>
     <a:masterClrMapping/>
   </p:clrMapOvr>
+  <p:timing>
+    <p:tnLst>
+      <p:par>
+        <p:cTn xmlns:p14="http://schemas.microsoft.com/office/powerpoint/2010/main" id="1" dur="indefinite" restart="never" nodeType="tmRoot"/>
+      </p:par>
+    </p:tnLst>
+  </p:timing>
 </p:sld>
 </file>
 
@@ -11980,6 +12015,13 @@
   <p:clrMapOvr>
     <a:masterClrMapping/>
   </p:clrMapOvr>
+  <p:timing>
+    <p:tnLst>
+      <p:par>
+        <p:cTn xmlns:p14="http://schemas.microsoft.com/office/powerpoint/2010/main" id="1" dur="indefinite" restart="never" nodeType="tmRoot"/>
+      </p:par>
+    </p:tnLst>
+  </p:timing>
 </p:sld>
 </file>
 
@@ -12063,6 +12105,13 @@
   <p:clrMapOvr>
     <a:masterClrMapping/>
   </p:clrMapOvr>
+  <p:timing>
+    <p:tnLst>
+      <p:par>
+        <p:cTn xmlns:p14="http://schemas.microsoft.com/office/powerpoint/2010/main" id="1" dur="indefinite" restart="never" nodeType="tmRoot"/>
+      </p:par>
+    </p:tnLst>
+  </p:timing>
 </p:sld>
 </file>
 
@@ -12146,6 +12195,13 @@
   <p:clrMapOvr>
     <a:masterClrMapping/>
   </p:clrMapOvr>
+  <p:timing>
+    <p:tnLst>
+      <p:par>
+        <p:cTn xmlns:p14="http://schemas.microsoft.com/office/powerpoint/2010/main" id="1" dur="indefinite" restart="never" nodeType="tmRoot"/>
+      </p:par>
+    </p:tnLst>
+  </p:timing>
 </p:sld>
 </file>
 
@@ -12229,6 +12285,13 @@
   <p:clrMapOvr>
     <a:masterClrMapping/>
   </p:clrMapOvr>
+  <p:timing>
+    <p:tnLst>
+      <p:par>
+        <p:cTn xmlns:p14="http://schemas.microsoft.com/office/powerpoint/2010/main" id="1" dur="indefinite" restart="never" nodeType="tmRoot"/>
+      </p:par>
+    </p:tnLst>
+  </p:timing>
 </p:sld>
 </file>
 
@@ -12368,6 +12431,13 @@
   <p:clrMapOvr>
     <a:masterClrMapping/>
   </p:clrMapOvr>
+  <p:timing>
+    <p:tnLst>
+      <p:par>
+        <p:cTn xmlns:p14="http://schemas.microsoft.com/office/powerpoint/2010/main" id="1" dur="indefinite" restart="never" nodeType="tmRoot"/>
+      </p:par>
+    </p:tnLst>
+  </p:timing>
 </p:sld>
 </file>
 
@@ -12564,7 +12634,7 @@
           </a:prstGeom>
           <a:noFill/>
           <a:extLst>
-            <a:ext uri="{909E8E84-426E-40DD-AFC4-6F175D3DCCD1}">
+            <a:ext uri="{909E8E84-426E-40dd-AFC4-6F175D3DCCD1}">
               <a14:hiddenFill xmlns:a14="http://schemas.microsoft.com/office/drawing/2010/main">
                 <a:solidFill>
                   <a:srgbClr val="FFFFFF"/>
@@ -12615,7 +12685,7 @@
           </a:prstGeom>
           <a:noFill/>
           <a:extLst>
-            <a:ext uri="{909E8E84-426E-40DD-AFC4-6F175D3DCCD1}">
+            <a:ext uri="{909E8E84-426E-40dd-AFC4-6F175D3DCCD1}">
               <a14:hiddenFill xmlns:a14="http://schemas.microsoft.com/office/drawing/2010/main">
                 <a:solidFill>
                   <a:srgbClr val="FFFFFF"/>
@@ -12656,7 +12726,7 @@
           </a:prstGeom>
           <a:noFill/>
           <a:extLst>
-            <a:ext uri="{909E8E84-426E-40DD-AFC4-6F175D3DCCD1}">
+            <a:ext uri="{909E8E84-426E-40dd-AFC4-6F175D3DCCD1}">
               <a14:hiddenFill xmlns:a14="http://schemas.microsoft.com/office/drawing/2010/main">
                 <a:solidFill>
                   <a:srgbClr val="FFFFFF"/>
@@ -12707,7 +12777,7 @@
           </a:prstGeom>
           <a:noFill/>
           <a:extLst>
-            <a:ext uri="{909E8E84-426E-40DD-AFC4-6F175D3DCCD1}">
+            <a:ext uri="{909E8E84-426E-40dd-AFC4-6F175D3DCCD1}">
               <a14:hiddenFill xmlns:a14="http://schemas.microsoft.com/office/drawing/2010/main">
                 <a:solidFill>
                   <a:srgbClr val="FFFFFF"/>
@@ -12748,7 +12818,7 @@
           </a:prstGeom>
           <a:noFill/>
           <a:extLst>
-            <a:ext uri="{909E8E84-426E-40DD-AFC4-6F175D3DCCD1}">
+            <a:ext uri="{909E8E84-426E-40dd-AFC4-6F175D3DCCD1}">
               <a14:hiddenFill xmlns:a14="http://schemas.microsoft.com/office/drawing/2010/main">
                 <a:solidFill>
                   <a:srgbClr val="FFFFFF"/>
@@ -12789,7 +12859,7 @@
           </a:prstGeom>
           <a:noFill/>
           <a:extLst>
-            <a:ext uri="{909E8E84-426E-40DD-AFC4-6F175D3DCCD1}">
+            <a:ext uri="{909E8E84-426E-40dd-AFC4-6F175D3DCCD1}">
               <a14:hiddenFill xmlns:a14="http://schemas.microsoft.com/office/drawing/2010/main">
                 <a:solidFill>
                   <a:srgbClr val="FFFFFF"/>
@@ -12840,7 +12910,7 @@
           </a:prstGeom>
           <a:noFill/>
           <a:extLst>
-            <a:ext uri="{909E8E84-426E-40DD-AFC4-6F175D3DCCD1}">
+            <a:ext uri="{909E8E84-426E-40dd-AFC4-6F175D3DCCD1}">
               <a14:hiddenFill xmlns:a14="http://schemas.microsoft.com/office/drawing/2010/main">
                 <a:solidFill>
                   <a:srgbClr val="FFFFFF"/>
@@ -12881,7 +12951,7 @@
           </a:prstGeom>
           <a:noFill/>
           <a:extLst>
-            <a:ext uri="{909E8E84-426E-40DD-AFC4-6F175D3DCCD1}">
+            <a:ext uri="{909E8E84-426E-40dd-AFC4-6F175D3DCCD1}">
               <a14:hiddenFill xmlns:a14="http://schemas.microsoft.com/office/drawing/2010/main">
                 <a:solidFill>
                   <a:srgbClr val="FFFFFF"/>
@@ -12904,7 +12974,7 @@
   <p:timing>
     <p:tnLst>
       <p:par>
-        <p:cTn id="1" dur="indefinite" restart="never" nodeType="tmRoot"/>
+        <p:cTn xmlns:p14="http://schemas.microsoft.com/office/powerpoint/2010/main" id="1" dur="indefinite" restart="never" nodeType="tmRoot"/>
       </p:par>
     </p:tnLst>
   </p:timing>
@@ -12964,6 +13034,13 @@
   <p:clrMapOvr>
     <a:masterClrMapping/>
   </p:clrMapOvr>
+  <p:timing>
+    <p:tnLst>
+      <p:par>
+        <p:cTn xmlns:p14="http://schemas.microsoft.com/office/powerpoint/2010/main" id="1" dur="indefinite" restart="never" nodeType="tmRoot"/>
+      </p:par>
+    </p:tnLst>
+  </p:timing>
 </p:sld>
 </file>
 
@@ -13045,14 +13122,14 @@
             <a:noFill/>
           </a:ln>
           <a:extLst>
-            <a:ext uri="{909E8E84-426E-40DD-AFC4-6F175D3DCCD1}">
+            <a:ext uri="{909E8E84-426E-40dd-AFC4-6F175D3DCCD1}">
               <a14:hiddenFill xmlns:a14="http://schemas.microsoft.com/office/drawing/2010/main">
                 <a:solidFill>
                   <a:schemeClr val="accent1"/>
                 </a:solidFill>
               </a14:hiddenFill>
             </a:ext>
-            <a:ext uri="{91240B29-F687-4F45-9708-019B960494DF}">
+            <a:ext uri="{91240B29-F687-4f45-9708-019B960494DF}">
               <a14:hiddenLine xmlns:a14="http://schemas.microsoft.com/office/drawing/2010/main" w="9525">
                 <a:solidFill>
                   <a:schemeClr val="tx1"/>
@@ -13099,14 +13176,14 @@
             <a:noFill/>
           </a:ln>
           <a:extLst>
-            <a:ext uri="{909E8E84-426E-40DD-AFC4-6F175D3DCCD1}">
+            <a:ext uri="{909E8E84-426E-40dd-AFC4-6F175D3DCCD1}">
               <a14:hiddenFill xmlns:a14="http://schemas.microsoft.com/office/drawing/2010/main">
                 <a:solidFill>
                   <a:schemeClr val="accent1"/>
                 </a:solidFill>
               </a14:hiddenFill>
             </a:ext>
-            <a:ext uri="{91240B29-F687-4F45-9708-019B960494DF}">
+            <a:ext uri="{91240B29-F687-4f45-9708-019B960494DF}">
               <a14:hiddenLine xmlns:a14="http://schemas.microsoft.com/office/drawing/2010/main" w="9525">
                 <a:solidFill>
                   <a:schemeClr val="tx1"/>
@@ -13129,6 +13206,13 @@
   <p:clrMapOvr>
     <a:masterClrMapping/>
   </p:clrMapOvr>
+  <p:timing>
+    <p:tnLst>
+      <p:par>
+        <p:cTn xmlns:p14="http://schemas.microsoft.com/office/powerpoint/2010/main" id="1" dur="indefinite" restart="never" nodeType="tmRoot"/>
+      </p:par>
+    </p:tnLst>
+  </p:timing>
 </p:sld>
 </file>
 
@@ -13299,6 +13383,13 @@
   <p:clrMapOvr>
     <a:masterClrMapping/>
   </p:clrMapOvr>
+  <p:timing>
+    <p:tnLst>
+      <p:par>
+        <p:cTn xmlns:p14="http://schemas.microsoft.com/office/powerpoint/2010/main" id="1" dur="indefinite" restart="never" nodeType="tmRoot"/>
+      </p:par>
+    </p:tnLst>
+  </p:timing>
 </p:sld>
 </file>
 
@@ -13470,6 +13561,13 @@
   <p:clrMapOvr>
     <a:masterClrMapping/>
   </p:clrMapOvr>
+  <p:timing>
+    <p:tnLst>
+      <p:par>
+        <p:cTn xmlns:p14="http://schemas.microsoft.com/office/powerpoint/2010/main" id="1" dur="indefinite" restart="never" nodeType="tmRoot"/>
+      </p:par>
+    </p:tnLst>
+  </p:timing>
 </p:sld>
 </file>
 
@@ -13526,6 +13624,13 @@
   <p:clrMapOvr>
     <a:masterClrMapping/>
   </p:clrMapOvr>
+  <p:timing>
+    <p:tnLst>
+      <p:par>
+        <p:cTn xmlns:p14="http://schemas.microsoft.com/office/powerpoint/2010/main" id="1" dur="indefinite" restart="never" nodeType="tmRoot"/>
+      </p:par>
+    </p:tnLst>
+  </p:timing>
 </p:sld>
 </file>
 
@@ -13592,8 +13697,17 @@
           <a:p>
             <a:r>
               <a:rPr lang="en-GB" dirty="0" smtClean="0"/>
-              <a:t>Remove all mandatory IDF dependencies</a:t>
-            </a:r>
+              <a:t>Remove all mandatory IDF </a:t>
+            </a:r>
+            <a:r>
+              <a:rPr lang="en-GB" dirty="0" smtClean="0"/>
+              <a:t>dependencies </a:t>
+            </a:r>
+            <a:r>
+              <a:rPr lang="en-GB" b="1" dirty="0" err="1" smtClean="0"/>
+              <a:t>quick_explicit</a:t>
+            </a:r>
+            <a:endParaRPr lang="en-GB" b="1" dirty="0" smtClean="0"/>
           </a:p>
           <a:p>
             <a:r>
@@ -13615,12 +13729,12 @@
               <a:t>Better naming and </a:t>
             </a:r>
             <a:r>
-              <a:rPr lang="en-GB" dirty="0" err="1" smtClean="0"/>
-              <a:t>auxillary</a:t>
-            </a:r>
-            <a:r>
               <a:rPr lang="en-GB" dirty="0" smtClean="0"/>
-              <a:t> workspace clean-up post-processing</a:t>
+              <a:t>auxiliary </a:t>
+            </a:r>
+            <a:r>
+              <a:rPr lang="en-GB" dirty="0" smtClean="0"/>
+              <a:t>workspace clean-up post-processing</a:t>
             </a:r>
           </a:p>
           <a:p>
@@ -13658,7 +13772,7 @@
   <p:timing>
     <p:tnLst>
       <p:par>
-        <p:cTn id="1" dur="indefinite" restart="never" nodeType="tmRoot"/>
+        <p:cTn xmlns:p14="http://schemas.microsoft.com/office/powerpoint/2010/main" id="1" dur="indefinite" restart="never" nodeType="tmRoot"/>
       </p:par>
     </p:tnLst>
   </p:timing>
@@ -13811,6 +13925,13 @@
   <p:clrMapOvr>
     <a:masterClrMapping/>
   </p:clrMapOvr>
+  <p:timing>
+    <p:tnLst>
+      <p:par>
+        <p:cTn xmlns:p14="http://schemas.microsoft.com/office/powerpoint/2010/main" id="1" dur="indefinite" restart="never" nodeType="tmRoot"/>
+      </p:par>
+    </p:tnLst>
+  </p:timing>
 </p:sld>
 </file>
 
@@ -13980,6 +14101,13 @@
   <p:clrMapOvr>
     <a:masterClrMapping/>
   </p:clrMapOvr>
+  <p:timing>
+    <p:tnLst>
+      <p:par>
+        <p:cTn xmlns:p14="http://schemas.microsoft.com/office/powerpoint/2010/main" id="1" dur="indefinite" restart="never" nodeType="tmRoot"/>
+      </p:par>
+    </p:tnLst>
+  </p:timing>
 </p:sld>
 </file>
 
@@ -14145,6 +14273,13 @@
   <p:clrMapOvr>
     <a:masterClrMapping/>
   </p:clrMapOvr>
+  <p:timing>
+    <p:tnLst>
+      <p:par>
+        <p:cTn xmlns:p14="http://schemas.microsoft.com/office/powerpoint/2010/main" id="1" dur="indefinite" restart="never" nodeType="tmRoot"/>
+      </p:par>
+    </p:tnLst>
+  </p:timing>
 </p:sld>
 </file>
 
@@ -14266,14 +14401,14 @@
             <a:noFill/>
           </a:ln>
           <a:extLst>
-            <a:ext uri="{909E8E84-426E-40DD-AFC4-6F175D3DCCD1}">
+            <a:ext uri="{909E8E84-426E-40dd-AFC4-6F175D3DCCD1}">
               <a14:hiddenFill xmlns:a14="http://schemas.microsoft.com/office/drawing/2010/main">
                 <a:solidFill>
                   <a:srgbClr val="FFFFFF"/>
                 </a:solidFill>
               </a14:hiddenFill>
             </a:ext>
-            <a:ext uri="{91240B29-F687-4F45-9708-019B960494DF}">
+            <a:ext uri="{91240B29-F687-4f45-9708-019B960494DF}">
               <a14:hiddenLine xmlns:a14="http://schemas.microsoft.com/office/drawing/2010/main" w="9525">
                 <a:solidFill>
                   <a:srgbClr val="000000"/>
@@ -14469,6 +14604,13 @@
   <p:clrMapOvr>
     <a:masterClrMapping/>
   </p:clrMapOvr>
+  <p:timing>
+    <p:tnLst>
+      <p:par>
+        <p:cTn xmlns:p14="http://schemas.microsoft.com/office/powerpoint/2010/main" id="1" dur="indefinite" restart="never" nodeType="tmRoot"/>
+      </p:par>
+    </p:tnLst>
+  </p:timing>
 </p:sld>
 </file>
 
@@ -14584,7 +14726,7 @@
           </a:prstGeom>
           <a:noFill/>
           <a:extLst>
-            <a:ext uri="{909E8E84-426E-40DD-AFC4-6F175D3DCCD1}">
+            <a:ext uri="{909E8E84-426E-40dd-AFC4-6F175D3DCCD1}">
               <a14:hiddenFill xmlns:a14="http://schemas.microsoft.com/office/drawing/2010/main">
                 <a:solidFill>
                   <a:srgbClr val="FFFFFF"/>
@@ -14623,7 +14765,7 @@
           </a:prstGeom>
           <a:noFill/>
           <a:extLst>
-            <a:ext uri="{909E8E84-426E-40DD-AFC4-6F175D3DCCD1}">
+            <a:ext uri="{909E8E84-426E-40dd-AFC4-6F175D3DCCD1}">
               <a14:hiddenFill xmlns:a14="http://schemas.microsoft.com/office/drawing/2010/main">
                 <a:solidFill>
                   <a:srgbClr val="FFFFFF"/>
@@ -14643,6 +14785,13 @@
   <p:clrMapOvr>
     <a:masterClrMapping/>
   </p:clrMapOvr>
+  <p:timing>
+    <p:tnLst>
+      <p:par>
+        <p:cTn xmlns:p14="http://schemas.microsoft.com/office/powerpoint/2010/main" id="1" dur="indefinite" restart="never" nodeType="tmRoot"/>
+      </p:par>
+    </p:tnLst>
+  </p:timing>
 </p:sld>
 </file>
 
@@ -14825,6 +14974,13 @@
   <p:clrMapOvr>
     <a:masterClrMapping/>
   </p:clrMapOvr>
+  <p:timing>
+    <p:tnLst>
+      <p:par>
+        <p:cTn xmlns:p14="http://schemas.microsoft.com/office/powerpoint/2010/main" id="1" dur="indefinite" restart="never" nodeType="tmRoot"/>
+      </p:par>
+    </p:tnLst>
+  </p:timing>
 </p:sld>
 </file>
 
@@ -14988,6 +15144,13 @@
   <p:clrMapOvr>
     <a:masterClrMapping/>
   </p:clrMapOvr>
+  <p:timing>
+    <p:tnLst>
+      <p:par>
+        <p:cTn xmlns:p14="http://schemas.microsoft.com/office/powerpoint/2010/main" id="1" dur="indefinite" restart="never" nodeType="tmRoot"/>
+      </p:par>
+    </p:tnLst>
+  </p:timing>
 </p:sld>
 </file>
 
@@ -15090,6 +15253,13 @@
   <p:clrMapOvr>
     <a:masterClrMapping/>
   </p:clrMapOvr>
+  <p:timing>
+    <p:tnLst>
+      <p:par>
+        <p:cTn xmlns:p14="http://schemas.microsoft.com/office/powerpoint/2010/main" id="1" dur="indefinite" restart="never" nodeType="tmRoot"/>
+      </p:par>
+    </p:tnLst>
+  </p:timing>
 </p:sld>
 </file>
 
@@ -15146,6 +15316,13 @@
   <p:clrMapOvr>
     <a:masterClrMapping/>
   </p:clrMapOvr>
+  <p:timing>
+    <p:tnLst>
+      <p:par>
+        <p:cTn xmlns:p14="http://schemas.microsoft.com/office/powerpoint/2010/main" id="1" dur="indefinite" restart="never" nodeType="tmRoot"/>
+      </p:par>
+    </p:tnLst>
+  </p:timing>
 </p:sld>
 </file>
 
@@ -15199,73 +15376,102 @@
             <p:ph idx="1"/>
           </p:nvPr>
         </p:nvSpPr>
-        <p:spPr/>
-        <p:txBody>
-          <a:bodyPr/>
-          <a:lstStyle/>
-          <a:p>
-            <a:r>
-              <a:rPr lang="en-US" dirty="0" smtClean="0"/>
+        <p:spPr>
+          <a:xfrm>
+            <a:off x="467544" y="836712"/>
+            <a:ext cx="8229600" cy="4205287"/>
+          </a:xfrm>
+        </p:spPr>
+        <p:txBody>
+          <a:bodyPr/>
+          <a:lstStyle/>
+          <a:p>
+            <a:r>
+              <a:rPr lang="en-US" sz="2000" dirty="0" smtClean="0"/>
               <a:t>Control and plot individual peak workspaces</a:t>
             </a:r>
           </a:p>
           <a:p>
             <a:r>
-              <a:rPr lang="en-US" dirty="0" smtClean="0"/>
+              <a:rPr lang="en-US" sz="2000" dirty="0" smtClean="0"/>
               <a:t>Control peak </a:t>
             </a:r>
             <a:r>
-              <a:rPr lang="en-US" dirty="0" err="1" smtClean="0"/>
+              <a:rPr lang="en-US" sz="2000" dirty="0" err="1" smtClean="0"/>
               <a:t>colour</a:t>
             </a:r>
             <a:r>
-              <a:rPr lang="en-US" dirty="0" smtClean="0"/>
+              <a:rPr lang="en-US" sz="2000" dirty="0" smtClean="0"/>
               <a:t> and background </a:t>
             </a:r>
             <a:r>
-              <a:rPr lang="en-US" dirty="0" err="1" smtClean="0"/>
+              <a:rPr lang="en-US" sz="2000" dirty="0" err="1" smtClean="0"/>
               <a:t>colour</a:t>
             </a:r>
-            <a:endParaRPr lang="en-US" dirty="0" smtClean="0"/>
-          </a:p>
-          <a:p>
-            <a:r>
-              <a:rPr lang="en-US" dirty="0" smtClean="0"/>
+            <a:endParaRPr lang="en-US" sz="2000" dirty="0" smtClean="0"/>
+          </a:p>
+          <a:p>
+            <a:r>
+              <a:rPr lang="en-US" sz="2000" dirty="0" smtClean="0"/>
               <a:t>Control hiding/showing the peak list </a:t>
             </a:r>
           </a:p>
           <a:p>
             <a:r>
-              <a:rPr lang="en-US" dirty="0" smtClean="0"/>
+              <a:rPr lang="en-US" sz="2000" dirty="0" smtClean="0"/>
               <a:t>Control showing background radius</a:t>
             </a:r>
           </a:p>
           <a:p>
             <a:r>
-              <a:rPr lang="en-US" dirty="0" smtClean="0"/>
+              <a:rPr lang="en-US" sz="2000" dirty="0" smtClean="0"/>
               <a:t>Python control is mirrored in </a:t>
             </a:r>
             <a:r>
-              <a:rPr lang="en-US" dirty="0" err="1" smtClean="0"/>
+              <a:rPr lang="en-US" sz="2000" dirty="0" err="1" smtClean="0"/>
               <a:t>SliceViewer</a:t>
             </a:r>
-            <a:endParaRPr lang="en-US" dirty="0" smtClean="0"/>
-          </a:p>
-          <a:p>
-            <a:r>
-              <a:rPr lang="en-US" dirty="0" smtClean="0"/>
+            <a:endParaRPr lang="en-US" sz="2000" dirty="0" smtClean="0"/>
+          </a:p>
+          <a:p>
+            <a:r>
+              <a:rPr lang="en-US" sz="2000" dirty="0" smtClean="0"/>
               <a:t>Documentation and examples: </a:t>
             </a:r>
             <a:r>
-              <a:rPr lang="en-US" dirty="0" smtClean="0">
+              <a:rPr lang="en-US" sz="2000" dirty="0" smtClean="0">
                 <a:hlinkClick r:id="rId3"/>
               </a:rPr>
               <a:t>http://www.mantidproject.org/SliceViewer_Python_Interface</a:t>
             </a:r>
-            <a:endParaRPr lang="en-US" dirty="0"/>
-          </a:p>
-        </p:txBody>
-      </p:sp>
+            <a:endParaRPr lang="en-US" sz="2000" dirty="0"/>
+          </a:p>
+        </p:txBody>
+      </p:sp>
+      <p:pic>
+        <p:nvPicPr>
+          <p:cNvPr id="5" name="Picture 4"/>
+          <p:cNvPicPr>
+            <a:picLocks noChangeAspect="1"/>
+          </p:cNvPicPr>
+          <p:nvPr/>
+        </p:nvPicPr>
+        <p:blipFill>
+          <a:blip r:embed="rId4"/>
+          <a:stretch>
+            <a:fillRect/>
+          </a:stretch>
+        </p:blipFill>
+        <p:spPr>
+          <a:xfrm>
+            <a:off x="1475656" y="3573016"/>
+            <a:ext cx="7092280" cy="2950557"/>
+          </a:xfrm>
+          <a:prstGeom prst="rect">
+            <a:avLst/>
+          </a:prstGeom>
+        </p:spPr>
+      </p:pic>
     </p:spTree>
     <p:extLst>
       <p:ext uri="{BB962C8B-B14F-4D97-AF65-F5344CB8AC3E}">
@@ -15279,7 +15485,7 @@
   <p:timing>
     <p:tnLst>
       <p:par>
-        <p:cTn id="1" dur="indefinite" restart="never" nodeType="tmRoot"/>
+        <p:cTn xmlns:p14="http://schemas.microsoft.com/office/powerpoint/2010/main" id="1" dur="indefinite" restart="never" nodeType="tmRoot"/>
       </p:par>
     </p:tnLst>
   </p:timing>
@@ -15360,6 +15566,13 @@
   <p:clrMapOvr>
     <a:masterClrMapping/>
   </p:clrMapOvr>
+  <p:timing>
+    <p:tnLst>
+      <p:par>
+        <p:cTn xmlns:p14="http://schemas.microsoft.com/office/powerpoint/2010/main" id="1" dur="indefinite" restart="never" nodeType="tmRoot"/>
+      </p:par>
+    </p:tnLst>
+  </p:timing>
 </p:sld>
 </file>
 
@@ -15445,7 +15658,7 @@
   <p:timing>
     <p:tnLst>
       <p:par>
-        <p:cTn id="1" dur="indefinite" restart="never" nodeType="tmRoot"/>
+        <p:cTn xmlns:p14="http://schemas.microsoft.com/office/powerpoint/2010/main" id="1" dur="indefinite" restart="never" nodeType="tmRoot"/>
       </p:par>
     </p:tnLst>
   </p:timing>
@@ -15639,6 +15852,13 @@
   <p:clrMapOvr>
     <a:masterClrMapping/>
   </p:clrMapOvr>
+  <p:timing>
+    <p:tnLst>
+      <p:par>
+        <p:cTn xmlns:p14="http://schemas.microsoft.com/office/powerpoint/2010/main" id="1" dur="indefinite" restart="never" nodeType="tmRoot"/>
+      </p:par>
+    </p:tnLst>
+  </p:timing>
 </p:sld>
 </file>
 
@@ -15765,7 +15985,6 @@
               <a:rPr lang="en-GB" dirty="0" smtClean="0"/>
               <a:t> May 2014</a:t>
             </a:r>
-            <a:endParaRPr lang="en-GB" dirty="0" smtClean="0"/>
           </a:p>
           <a:p>
             <a:endParaRPr lang="en-GB" dirty="0" smtClean="0"/>
@@ -15775,7 +15994,6 @@
               <a:rPr lang="en-GB" dirty="0" smtClean="0"/>
               <a:t>Mantid Roadmap coming soon!</a:t>
             </a:r>
-            <a:endParaRPr lang="en-GB" dirty="0" smtClean="0"/>
           </a:p>
           <a:p>
             <a:pPr lvl="1"/>
@@ -15804,7 +16022,6 @@
               <a:rPr lang="en-GB" dirty="0" smtClean="0"/>
               <a:t>Facility scientific computing strategies</a:t>
             </a:r>
-            <a:endParaRPr lang="en-GB" dirty="0" smtClean="0"/>
           </a:p>
           <a:p>
             <a:pPr lvl="2"/>
@@ -15812,7 +16029,6 @@
               <a:rPr lang="en-GB" dirty="0" smtClean="0"/>
               <a:t>Technical changes and updates</a:t>
             </a:r>
-            <a:endParaRPr lang="en-GB" dirty="0" smtClean="0"/>
           </a:p>
         </p:txBody>
       </p:sp>
@@ -15829,7 +16045,7 @@
   <p:timing>
     <p:tnLst>
       <p:par>
-        <p:cTn id="1" dur="indefinite" restart="never" nodeType="tmRoot"/>
+        <p:cTn xmlns:p14="http://schemas.microsoft.com/office/powerpoint/2010/main" id="1" dur="indefinite" restart="never" nodeType="tmRoot"/>
       </p:par>
     </p:tnLst>
   </p:timing>
@@ -16016,7 +16232,7 @@
           </a:prstGeom>
           <a:noFill/>
           <a:extLst>
-            <a:ext uri="{909E8E84-426E-40DD-AFC4-6F175D3DCCD1}">
+            <a:ext uri="{909E8E84-426E-40dd-AFC4-6F175D3DCCD1}">
               <a14:hiddenFill xmlns:a14="http://schemas.microsoft.com/office/drawing/2010/main">
                 <a:solidFill>
                   <a:srgbClr val="FFFFFF"/>
@@ -16036,6 +16252,13 @@
   <p:clrMapOvr>
     <a:masterClrMapping/>
   </p:clrMapOvr>
+  <p:timing>
+    <p:tnLst>
+      <p:par>
+        <p:cTn xmlns:p14="http://schemas.microsoft.com/office/powerpoint/2010/main" id="1" dur="indefinite" restart="never" nodeType="tmRoot"/>
+      </p:par>
+    </p:tnLst>
+  </p:timing>
 </p:sld>
 </file>
 
@@ -16126,7 +16349,7 @@
   <p:timing>
     <p:tnLst>
       <p:par>
-        <p:cTn id="1" dur="indefinite" restart="never" nodeType="tmRoot"/>
+        <p:cTn xmlns:p14="http://schemas.microsoft.com/office/powerpoint/2010/main" id="1" dur="indefinite" restart="never" nodeType="tmRoot"/>
       </p:par>
     </p:tnLst>
   </p:timing>
@@ -16298,7 +16521,7 @@
           </a:prstGeom>
           <a:noFill/>
           <a:extLst>
-            <a:ext uri="{909E8E84-426E-40DD-AFC4-6F175D3DCCD1}">
+            <a:ext uri="{909E8E84-426E-40dd-AFC4-6F175D3DCCD1}">
               <a14:hiddenFill xmlns:a14="http://schemas.microsoft.com/office/drawing/2010/main">
                 <a:solidFill>
                   <a:srgbClr val="FFFFFF"/>
@@ -16326,7 +16549,7 @@
           </a:prstGeom>
           <a:noFill/>
           <a:extLst>
-            <a:ext uri="{909E8E84-426E-40DD-AFC4-6F175D3DCCD1}">
+            <a:ext uri="{909E8E84-426E-40dd-AFC4-6F175D3DCCD1}">
               <a14:hiddenFill xmlns:a14="http://schemas.microsoft.com/office/drawing/2010/main">
                 <a:solidFill>
                   <a:srgbClr val="FFFFFF"/>
@@ -16376,7 +16599,7 @@
           </a:prstGeom>
           <a:noFill/>
           <a:extLst>
-            <a:ext uri="{909E8E84-426E-40DD-AFC4-6F175D3DCCD1}">
+            <a:ext uri="{909E8E84-426E-40dd-AFC4-6F175D3DCCD1}">
               <a14:hiddenFill xmlns:a14="http://schemas.microsoft.com/office/drawing/2010/main">
                 <a:solidFill>
                   <a:srgbClr val="FFFFFF"/>
@@ -16466,7 +16689,7 @@
           </a:prstGeom>
           <a:noFill/>
           <a:extLst>
-            <a:ext uri="{909E8E84-426E-40DD-AFC4-6F175D3DCCD1}">
+            <a:ext uri="{909E8E84-426E-40dd-AFC4-6F175D3DCCD1}">
               <a14:hiddenFill xmlns:a14="http://schemas.microsoft.com/office/drawing/2010/main">
                 <a:solidFill>
                   <a:srgbClr val="FFFFFF"/>
@@ -16489,7 +16712,7 @@
   <p:timing>
     <p:tnLst>
       <p:par>
-        <p:cTn id="1" dur="indefinite" restart="never" nodeType="tmRoot"/>
+        <p:cTn xmlns:p14="http://schemas.microsoft.com/office/powerpoint/2010/main" id="1" dur="indefinite" restart="never" nodeType="tmRoot"/>
       </p:par>
     </p:tnLst>
   </p:timing>
@@ -16549,6 +16772,13 @@
   <p:clrMapOvr>
     <a:masterClrMapping/>
   </p:clrMapOvr>
+  <p:timing>
+    <p:tnLst>
+      <p:par>
+        <p:cTn xmlns:p14="http://schemas.microsoft.com/office/powerpoint/2010/main" id="1" dur="indefinite" restart="never" nodeType="tmRoot"/>
+      </p:par>
+    </p:tnLst>
+  </p:timing>
 </p:sld>
 </file>
 
@@ -16655,7 +16885,7 @@
           </a:prstGeom>
           <a:noFill/>
           <a:extLst>
-            <a:ext uri="{909E8E84-426E-40DD-AFC4-6F175D3DCCD1}">
+            <a:ext uri="{909E8E84-426E-40dd-AFC4-6F175D3DCCD1}">
               <a14:hiddenFill xmlns:a14="http://schemas.microsoft.com/office/drawing/2010/main">
                 <a:solidFill>
                   <a:srgbClr val="FFFFFF"/>
@@ -16678,7 +16908,7 @@
   <p:timing>
     <p:tnLst>
       <p:par>
-        <p:cTn id="1" dur="indefinite" restart="never" nodeType="tmRoot"/>
+        <p:cTn xmlns:p14="http://schemas.microsoft.com/office/powerpoint/2010/main" id="1" dur="indefinite" restart="never" nodeType="tmRoot"/>
       </p:par>
     </p:tnLst>
   </p:timing>
@@ -16778,7 +17008,7 @@
           </a:prstGeom>
           <a:noFill/>
           <a:extLst>
-            <a:ext uri="{909E8E84-426E-40DD-AFC4-6F175D3DCCD1}">
+            <a:ext uri="{909E8E84-426E-40dd-AFC4-6F175D3DCCD1}">
               <a14:hiddenFill xmlns:a14="http://schemas.microsoft.com/office/drawing/2010/main">
                 <a:solidFill>
                   <a:srgbClr val="FFFFFF"/>
@@ -16801,7 +17031,7 @@
   <p:timing>
     <p:tnLst>
       <p:par>
-        <p:cTn id="1" dur="indefinite" restart="never" nodeType="tmRoot"/>
+        <p:cTn xmlns:p14="http://schemas.microsoft.com/office/powerpoint/2010/main" id="1" dur="indefinite" restart="never" nodeType="tmRoot"/>
       </p:par>
     </p:tnLst>
   </p:timing>

</xml_diff>